<commit_message>
upd_2_0_8_4 WINTER SESSION EDITION
</commit_message>
<xml_diff>
--- a/KIP/3 курс ПКС/Практика /ПравОбесп/бизнес-план.pptx
+++ b/KIP/3 курс ПКС/Практика /ПравОбесп/бизнес-план.pptx
@@ -119,6 +119,11 @@
       </a:defRPr>
     </a:lvl9pPr>
   </p:defaultTextStyle>
+  <p:extLst>
+    <p:ext uri="{EFAFB233-063F-42B5-8137-9DF3F51BA10A}">
+      <p15:sldGuideLst xmlns:p15="http://schemas.microsoft.com/office/powerpoint/2012/main"/>
+    </p:ext>
+  </p:extLst>
 </p:presentation>
 </file>
 
@@ -7648,71 +7653,6 @@
             <a:r>
               <a:rPr lang="ru-RU" dirty="0"/>
               <a:t>Зайцев Н. Гивчак Д. Мацапура А.</a:t>
-            </a:r>
-          </a:p>
-        </p:txBody>
-      </p:sp>
-      <p:pic>
-        <p:nvPicPr>
-          <p:cNvPr id="8" name="Рисунок 7">
-            <a:extLst>
-              <a:ext uri="{FF2B5EF4-FFF2-40B4-BE49-F238E27FC236}">
-                <a16:creationId xmlns:a16="http://schemas.microsoft.com/office/drawing/2014/main" id="{889A90AA-9D57-944A-ADD2-70FAF7020359}"/>
-              </a:ext>
-            </a:extLst>
-          </p:cNvPr>
-          <p:cNvPicPr>
-            <a:picLocks noChangeAspect="1"/>
-          </p:cNvPicPr>
-          <p:nvPr/>
-        </p:nvPicPr>
-        <p:blipFill>
-          <a:blip r:embed="rId2"/>
-          <a:stretch>
-            <a:fillRect/>
-          </a:stretch>
-        </p:blipFill>
-        <p:spPr>
-          <a:xfrm>
-            <a:off x="9056824" y="1499188"/>
-            <a:ext cx="3234426" cy="2751221"/>
-          </a:xfrm>
-          <a:prstGeom prst="rect">
-            <a:avLst/>
-          </a:prstGeom>
-        </p:spPr>
-      </p:pic>
-      <p:sp>
-        <p:nvSpPr>
-          <p:cNvPr id="9" name="TextBox 8">
-            <a:extLst>
-              <a:ext uri="{FF2B5EF4-FFF2-40B4-BE49-F238E27FC236}">
-                <a16:creationId xmlns:a16="http://schemas.microsoft.com/office/drawing/2014/main" id="{9653B9FE-C80B-9941-9892-BC427DA89C96}"/>
-              </a:ext>
-            </a:extLst>
-          </p:cNvPr>
-          <p:cNvSpPr txBox="1"/>
-          <p:nvPr/>
-        </p:nvSpPr>
-        <p:spPr>
-          <a:xfrm>
-            <a:off x="5998866" y="2076647"/>
-            <a:ext cx="3262432" cy="369332"/>
-          </a:xfrm>
-          <a:prstGeom prst="rect">
-            <a:avLst/>
-          </a:prstGeom>
-          <a:noFill/>
-        </p:spPr>
-        <p:txBody>
-          <a:bodyPr wrap="none" rtlCol="0">
-            <a:spAutoFit/>
-          </a:bodyPr>
-          <a:lstStyle/>
-          <a:p>
-            <a:r>
-              <a:rPr lang="ru-RU" dirty="0"/>
-              <a:t>Добро пожаловать, славяне!</a:t>
             </a:r>
           </a:p>
         </p:txBody>

</xml_diff>